<commit_message>
final popcount in all its glory
</commit_message>
<xml_diff>
--- a/figs/popcount.pptx
+++ b/figs/popcount.pptx
@@ -3873,9 +3873,9 @@
             <p:grpSpPr>
               <a:xfrm>
                 <a:off x="1409907" y="409361"/>
-                <a:ext cx="4411234" cy="6039277"/>
+                <a:ext cx="4421173" cy="6040264"/>
                 <a:chOff x="1336165" y="133369"/>
-                <a:chExt cx="4411234" cy="6039277"/>
+                <a:chExt cx="4421173" cy="6040264"/>
               </a:xfrm>
             </p:grpSpPr>
             <p:grpSp>
@@ -3913,7 +3913,7 @@
                 <p:spPr>
                   <a:xfrm>
                     <a:off x="1857043" y="673101"/>
-                    <a:ext cx="467058" cy="444504"/>
+                    <a:ext cx="512612" cy="444504"/>
                   </a:xfrm>
                   <a:prstGeom prst="rect">
                     <a:avLst/>
@@ -3956,6 +3956,19 @@
                       </a:rPr>
                       <a:t>ADD</a:t>
                     </a:r>
+                    <a:r>
+                      <a:rPr lang="en-US" sz="1200" baseline="-25000" dirty="0">
+                        <a:solidFill>
+                          <a:schemeClr val="tx1"/>
+                        </a:solidFill>
+                      </a:rPr>
+                      <a:t>1</a:t>
+                    </a:r>
+                    <a:endParaRPr lang="en-US" sz="1200" dirty="0">
+                      <a:solidFill>
+                        <a:schemeClr val="tx1"/>
+                      </a:solidFill>
+                    </a:endParaRPr>
                   </a:p>
                 </p:txBody>
               </p:sp>
@@ -4088,13 +4101,15 @@
                       </a:ext>
                     </a:extLst>
                   </p:cNvPr>
-                  <p:cNvCxnSpPr/>
+                  <p:cNvCxnSpPr>
+                    <a:cxnSpLocks/>
+                  </p:cNvCxnSpPr>
                   <p:nvPr/>
                 </p:nvCxnSpPr>
                 <p:spPr>
                   <a:xfrm>
-                    <a:off x="2328882" y="783464"/>
-                    <a:ext cx="508000" cy="0"/>
+                    <a:off x="2371431" y="783464"/>
+                    <a:ext cx="465451" cy="0"/>
                   </a:xfrm>
                   <a:prstGeom prst="line">
                     <a:avLst/>
@@ -4127,13 +4142,15 @@
                       </a:ext>
                     </a:extLst>
                   </p:cNvPr>
-                  <p:cNvCxnSpPr/>
+                  <p:cNvCxnSpPr>
+                    <a:cxnSpLocks/>
+                  </p:cNvCxnSpPr>
                   <p:nvPr/>
                 </p:nvCxnSpPr>
                 <p:spPr>
                   <a:xfrm>
-                    <a:off x="2324101" y="1002762"/>
-                    <a:ext cx="508000" cy="0"/>
+                    <a:off x="2361271" y="1002762"/>
+                    <a:ext cx="470830" cy="0"/>
                   </a:xfrm>
                   <a:prstGeom prst="line">
                     <a:avLst/>
@@ -4213,8 +4230,8 @@
               </p:nvSpPr>
               <p:spPr>
                 <a:xfrm>
-                  <a:off x="1856214" y="893746"/>
-                  <a:ext cx="467058" cy="444504"/>
+                  <a:off x="1856213" y="893746"/>
+                  <a:ext cx="510685" cy="444504"/>
                 </a:xfrm>
                 <a:prstGeom prst="rect">
                   <a:avLst/>
@@ -4257,6 +4274,19 @@
                     </a:rPr>
                     <a:t>ADD</a:t>
                   </a:r>
+                  <a:r>
+                    <a:rPr lang="en-US" sz="1200" baseline="-25000" dirty="0">
+                      <a:solidFill>
+                        <a:schemeClr val="tx1"/>
+                      </a:solidFill>
+                    </a:rPr>
+                    <a:t>1</a:t>
+                  </a:r>
+                  <a:endParaRPr lang="en-US" sz="1200" dirty="0">
+                    <a:solidFill>
+                      <a:schemeClr val="tx1"/>
+                    </a:solidFill>
+                  </a:endParaRPr>
                 </a:p>
               </p:txBody>
             </p:sp>
@@ -4389,13 +4419,15 @@
                     </a:ext>
                   </a:extLst>
                 </p:cNvPr>
-                <p:cNvCxnSpPr/>
+                <p:cNvCxnSpPr>
+                  <a:cxnSpLocks/>
+                </p:cNvCxnSpPr>
                 <p:nvPr/>
               </p:nvCxnSpPr>
               <p:spPr>
                 <a:xfrm>
-                  <a:off x="2328882" y="1004109"/>
-                  <a:ext cx="508000" cy="0"/>
+                  <a:off x="2364658" y="1004109"/>
+                  <a:ext cx="472224" cy="0"/>
                 </a:xfrm>
                 <a:prstGeom prst="line">
                   <a:avLst/>
@@ -4428,13 +4460,15 @@
                     </a:ext>
                   </a:extLst>
                 </p:cNvPr>
-                <p:cNvCxnSpPr/>
+                <p:cNvCxnSpPr>
+                  <a:cxnSpLocks/>
+                </p:cNvCxnSpPr>
                 <p:nvPr/>
               </p:nvCxnSpPr>
               <p:spPr>
                 <a:xfrm>
-                  <a:off x="2328882" y="1223407"/>
-                  <a:ext cx="508000" cy="0"/>
+                  <a:off x="2361271" y="1223407"/>
+                  <a:ext cx="475611" cy="0"/>
                 </a:xfrm>
                 <a:prstGeom prst="line">
                   <a:avLst/>
@@ -4513,8 +4547,8 @@
               </p:nvSpPr>
               <p:spPr>
                 <a:xfrm>
-                  <a:off x="1844165" y="1700601"/>
-                  <a:ext cx="467058" cy="444504"/>
+                  <a:off x="1844164" y="1700601"/>
+                  <a:ext cx="510334" cy="444504"/>
                 </a:xfrm>
                 <a:prstGeom prst="rect">
                   <a:avLst/>
@@ -4557,6 +4591,19 @@
                     </a:rPr>
                     <a:t>ADD</a:t>
                   </a:r>
+                  <a:r>
+                    <a:rPr lang="en-US" sz="1200" baseline="-25000" dirty="0">
+                      <a:solidFill>
+                        <a:schemeClr val="tx1"/>
+                      </a:solidFill>
+                    </a:rPr>
+                    <a:t>1</a:t>
+                  </a:r>
+                  <a:endParaRPr lang="en-US" sz="1200" dirty="0">
+                    <a:solidFill>
+                      <a:schemeClr val="tx1"/>
+                    </a:solidFill>
+                  </a:endParaRPr>
                 </a:p>
               </p:txBody>
             </p:sp>
@@ -4689,13 +4736,15 @@
                     </a:ext>
                   </a:extLst>
                 </p:cNvPr>
-                <p:cNvCxnSpPr/>
+                <p:cNvCxnSpPr>
+                  <a:cxnSpLocks/>
+                </p:cNvCxnSpPr>
                 <p:nvPr/>
               </p:nvCxnSpPr>
               <p:spPr>
                 <a:xfrm>
-                  <a:off x="2316833" y="1810964"/>
-                  <a:ext cx="508000" cy="0"/>
+                  <a:off x="2361271" y="1810964"/>
+                  <a:ext cx="463562" cy="0"/>
                 </a:xfrm>
                 <a:prstGeom prst="line">
                   <a:avLst/>
@@ -4728,13 +4777,15 @@
                     </a:ext>
                   </a:extLst>
                 </p:cNvPr>
-                <p:cNvCxnSpPr/>
+                <p:cNvCxnSpPr>
+                  <a:cxnSpLocks/>
+                </p:cNvCxnSpPr>
                 <p:nvPr/>
               </p:nvCxnSpPr>
               <p:spPr>
                 <a:xfrm>
-                  <a:off x="2316833" y="2030262"/>
-                  <a:ext cx="508000" cy="0"/>
+                  <a:off x="2361271" y="2030262"/>
+                  <a:ext cx="463562" cy="0"/>
                 </a:xfrm>
                 <a:prstGeom prst="line">
                   <a:avLst/>
@@ -4812,7 +4863,7 @@
               <p:spPr>
                 <a:xfrm>
                   <a:off x="1857043" y="2472702"/>
-                  <a:ext cx="467058" cy="444504"/>
+                  <a:ext cx="511002" cy="444504"/>
                 </a:xfrm>
                 <a:prstGeom prst="rect">
                   <a:avLst/>
@@ -4855,6 +4906,19 @@
                     </a:rPr>
                     <a:t>ADD</a:t>
                   </a:r>
+                  <a:r>
+                    <a:rPr lang="en-US" sz="1200" baseline="-25000" dirty="0">
+                      <a:solidFill>
+                        <a:schemeClr val="tx1"/>
+                      </a:solidFill>
+                    </a:rPr>
+                    <a:t>1</a:t>
+                  </a:r>
+                  <a:endParaRPr lang="en-US" sz="1200" dirty="0">
+                    <a:solidFill>
+                      <a:schemeClr val="tx1"/>
+                    </a:solidFill>
+                  </a:endParaRPr>
                 </a:p>
               </p:txBody>
             </p:sp>
@@ -4987,13 +5051,15 @@
                     </a:ext>
                   </a:extLst>
                 </p:cNvPr>
-                <p:cNvCxnSpPr/>
+                <p:cNvCxnSpPr>
+                  <a:cxnSpLocks/>
+                </p:cNvCxnSpPr>
                 <p:nvPr/>
               </p:nvCxnSpPr>
               <p:spPr>
                 <a:xfrm>
-                  <a:off x="2324101" y="2583065"/>
-                  <a:ext cx="508000" cy="0"/>
+                  <a:off x="2368045" y="2583065"/>
+                  <a:ext cx="464056" cy="0"/>
                 </a:xfrm>
                 <a:prstGeom prst="line">
                   <a:avLst/>
@@ -5026,13 +5092,15 @@
                     </a:ext>
                   </a:extLst>
                 </p:cNvPr>
-                <p:cNvCxnSpPr/>
+                <p:cNvCxnSpPr>
+                  <a:cxnSpLocks/>
+                </p:cNvCxnSpPr>
                 <p:nvPr/>
               </p:nvCxnSpPr>
               <p:spPr>
                 <a:xfrm>
-                  <a:off x="2324101" y="2802363"/>
-                  <a:ext cx="508000" cy="0"/>
+                  <a:off x="2364658" y="2802363"/>
+                  <a:ext cx="467443" cy="0"/>
                 </a:xfrm>
                 <a:prstGeom prst="line">
                   <a:avLst/>
@@ -5129,8 +5197,8 @@
                 </p:nvSpPr>
                 <p:spPr>
                   <a:xfrm>
-                    <a:off x="1857043" y="673101"/>
-                    <a:ext cx="467058" cy="444504"/>
+                    <a:off x="1857041" y="673101"/>
+                    <a:ext cx="513233" cy="444504"/>
                   </a:xfrm>
                   <a:prstGeom prst="rect">
                     <a:avLst/>
@@ -5173,6 +5241,19 @@
                       </a:rPr>
                       <a:t>ADD</a:t>
                     </a:r>
+                    <a:r>
+                      <a:rPr lang="en-US" sz="1200" baseline="-25000" dirty="0">
+                        <a:solidFill>
+                          <a:schemeClr val="tx1"/>
+                        </a:solidFill>
+                      </a:rPr>
+                      <a:t>1</a:t>
+                    </a:r>
+                    <a:endParaRPr lang="en-US" sz="1200" dirty="0">
+                      <a:solidFill>
+                        <a:schemeClr val="tx1"/>
+                      </a:solidFill>
+                    </a:endParaRPr>
                   </a:p>
                 </p:txBody>
               </p:sp>
@@ -5305,13 +5386,15 @@
                       </a:ext>
                     </a:extLst>
                   </p:cNvPr>
-                  <p:cNvCxnSpPr/>
+                  <p:cNvCxnSpPr>
+                    <a:cxnSpLocks/>
+                  </p:cNvCxnSpPr>
                   <p:nvPr/>
                 </p:nvCxnSpPr>
                 <p:spPr>
                   <a:xfrm>
-                    <a:off x="2324101" y="783464"/>
-                    <a:ext cx="508000" cy="0"/>
+                    <a:off x="2360115" y="783464"/>
+                    <a:ext cx="471986" cy="0"/>
                   </a:xfrm>
                   <a:prstGeom prst="line">
                     <a:avLst/>
@@ -5344,13 +5427,15 @@
                       </a:ext>
                     </a:extLst>
                   </p:cNvPr>
-                  <p:cNvCxnSpPr/>
+                  <p:cNvCxnSpPr>
+                    <a:cxnSpLocks/>
+                  </p:cNvCxnSpPr>
                   <p:nvPr/>
                 </p:nvCxnSpPr>
                 <p:spPr>
                   <a:xfrm>
-                    <a:off x="2324101" y="1002762"/>
-                    <a:ext cx="508000" cy="0"/>
+                    <a:off x="2366888" y="1002762"/>
+                    <a:ext cx="465213" cy="0"/>
                   </a:xfrm>
                   <a:prstGeom prst="line">
                     <a:avLst/>
@@ -5428,8 +5513,8 @@
               </p:nvSpPr>
               <p:spPr>
                 <a:xfrm>
-                  <a:off x="1845463" y="4000700"/>
-                  <a:ext cx="467058" cy="444504"/>
+                  <a:off x="1845462" y="4000700"/>
+                  <a:ext cx="512423" cy="444504"/>
                 </a:xfrm>
                 <a:prstGeom prst="rect">
                   <a:avLst/>
@@ -5472,6 +5557,19 @@
                     </a:rPr>
                     <a:t>ADD</a:t>
                   </a:r>
+                  <a:r>
+                    <a:rPr lang="en-US" sz="1200" baseline="-25000" dirty="0">
+                      <a:solidFill>
+                        <a:schemeClr val="tx1"/>
+                      </a:solidFill>
+                    </a:rPr>
+                    <a:t>1</a:t>
+                  </a:r>
+                  <a:endParaRPr lang="en-US" sz="1200" dirty="0">
+                    <a:solidFill>
+                      <a:schemeClr val="tx1"/>
+                    </a:solidFill>
+                  </a:endParaRPr>
                 </a:p>
               </p:txBody>
             </p:sp>
@@ -5604,13 +5702,15 @@
                     </a:ext>
                   </a:extLst>
                 </p:cNvPr>
-                <p:cNvCxnSpPr/>
+                <p:cNvCxnSpPr>
+                  <a:cxnSpLocks/>
+                </p:cNvCxnSpPr>
                 <p:nvPr/>
               </p:nvCxnSpPr>
               <p:spPr>
                 <a:xfrm>
-                  <a:off x="2312521" y="4111063"/>
-                  <a:ext cx="508000" cy="0"/>
+                  <a:off x="2354498" y="4111063"/>
+                  <a:ext cx="466023" cy="0"/>
                 </a:xfrm>
                 <a:prstGeom prst="line">
                   <a:avLst/>
@@ -5643,13 +5743,15 @@
                     </a:ext>
                   </a:extLst>
                 </p:cNvPr>
-                <p:cNvCxnSpPr/>
+                <p:cNvCxnSpPr>
+                  <a:cxnSpLocks/>
+                </p:cNvCxnSpPr>
                 <p:nvPr/>
               </p:nvCxnSpPr>
               <p:spPr>
                 <a:xfrm>
-                  <a:off x="2312521" y="4330361"/>
-                  <a:ext cx="508000" cy="0"/>
+                  <a:off x="2361271" y="4330361"/>
+                  <a:ext cx="459250" cy="0"/>
                 </a:xfrm>
                 <a:prstGeom prst="line">
                   <a:avLst/>
@@ -5726,8 +5828,8 @@
               </p:nvSpPr>
               <p:spPr>
                 <a:xfrm>
-                  <a:off x="1847374" y="4807555"/>
-                  <a:ext cx="467058" cy="444504"/>
+                  <a:off x="1847373" y="4807555"/>
+                  <a:ext cx="520672" cy="444504"/>
                 </a:xfrm>
                 <a:prstGeom prst="rect">
                   <a:avLst/>
@@ -5770,6 +5872,19 @@
                     </a:rPr>
                     <a:t>ADD</a:t>
                   </a:r>
+                  <a:r>
+                    <a:rPr lang="en-US" sz="1200" baseline="-25000" dirty="0">
+                      <a:solidFill>
+                        <a:schemeClr val="tx1"/>
+                      </a:solidFill>
+                    </a:rPr>
+                    <a:t>1</a:t>
+                  </a:r>
+                  <a:endParaRPr lang="en-US" sz="1200" dirty="0">
+                    <a:solidFill>
+                      <a:schemeClr val="tx1"/>
+                    </a:solidFill>
+                  </a:endParaRPr>
                 </a:p>
               </p:txBody>
             </p:sp>
@@ -5902,13 +6017,15 @@
                     </a:ext>
                   </a:extLst>
                 </p:cNvPr>
-                <p:cNvCxnSpPr/>
+                <p:cNvCxnSpPr>
+                  <a:cxnSpLocks/>
+                </p:cNvCxnSpPr>
                 <p:nvPr/>
               </p:nvCxnSpPr>
               <p:spPr>
                 <a:xfrm>
-                  <a:off x="2314432" y="4917918"/>
-                  <a:ext cx="508000" cy="0"/>
+                  <a:off x="2361271" y="4917918"/>
+                  <a:ext cx="461161" cy="0"/>
                 </a:xfrm>
                 <a:prstGeom prst="line">
                   <a:avLst/>
@@ -5941,13 +6058,15 @@
                     </a:ext>
                   </a:extLst>
                 </p:cNvPr>
-                <p:cNvCxnSpPr/>
+                <p:cNvCxnSpPr>
+                  <a:cxnSpLocks/>
+                </p:cNvCxnSpPr>
                 <p:nvPr/>
               </p:nvCxnSpPr>
               <p:spPr>
                 <a:xfrm>
-                  <a:off x="2314432" y="5137216"/>
-                  <a:ext cx="508000" cy="0"/>
+                  <a:off x="2371431" y="5137216"/>
+                  <a:ext cx="451001" cy="0"/>
                 </a:xfrm>
                 <a:prstGeom prst="line">
                   <a:avLst/>
@@ -6024,8 +6143,8 @@
               </p:nvSpPr>
               <p:spPr>
                 <a:xfrm>
-                  <a:off x="1851902" y="5579656"/>
-                  <a:ext cx="467058" cy="444504"/>
+                  <a:off x="1851901" y="5579656"/>
+                  <a:ext cx="516433" cy="444504"/>
                 </a:xfrm>
                 <a:prstGeom prst="rect">
                   <a:avLst/>
@@ -6068,6 +6187,19 @@
                     </a:rPr>
                     <a:t>ADD</a:t>
                   </a:r>
+                  <a:r>
+                    <a:rPr lang="en-US" sz="1200" baseline="-25000" dirty="0">
+                      <a:solidFill>
+                        <a:schemeClr val="tx1"/>
+                      </a:solidFill>
+                    </a:rPr>
+                    <a:t>1</a:t>
+                  </a:r>
+                  <a:endParaRPr lang="en-US" sz="1200" dirty="0">
+                    <a:solidFill>
+                      <a:schemeClr val="tx1"/>
+                    </a:solidFill>
+                  </a:endParaRPr>
                 </a:p>
               </p:txBody>
             </p:sp>
@@ -6200,13 +6332,15 @@
                     </a:ext>
                   </a:extLst>
                 </p:cNvPr>
-                <p:cNvCxnSpPr/>
+                <p:cNvCxnSpPr>
+                  <a:cxnSpLocks/>
+                </p:cNvCxnSpPr>
                 <p:nvPr/>
               </p:nvCxnSpPr>
               <p:spPr>
                 <a:xfrm>
-                  <a:off x="2318960" y="5690019"/>
-                  <a:ext cx="508000" cy="0"/>
+                  <a:off x="2361271" y="5690019"/>
+                  <a:ext cx="465689" cy="0"/>
                 </a:xfrm>
                 <a:prstGeom prst="line">
                   <a:avLst/>
@@ -6239,13 +6373,15 @@
                     </a:ext>
                   </a:extLst>
                 </p:cNvPr>
-                <p:cNvCxnSpPr/>
+                <p:cNvCxnSpPr>
+                  <a:cxnSpLocks/>
+                </p:cNvCxnSpPr>
                 <p:nvPr/>
               </p:nvCxnSpPr>
               <p:spPr>
                 <a:xfrm>
-                  <a:off x="2318960" y="5909317"/>
-                  <a:ext cx="508000" cy="0"/>
+                  <a:off x="2374818" y="5909317"/>
+                  <a:ext cx="452142" cy="0"/>
                 </a:xfrm>
                 <a:prstGeom prst="line">
                   <a:avLst/>
@@ -6323,7 +6459,7 @@
               <p:spPr>
                 <a:xfrm>
                   <a:off x="2837646" y="133369"/>
-                  <a:ext cx="467058" cy="1204875"/>
+                  <a:ext cx="512532" cy="1204875"/>
                 </a:xfrm>
                 <a:prstGeom prst="rect">
                   <a:avLst/>
@@ -6366,6 +6502,19 @@
                     </a:rPr>
                     <a:t>ADD</a:t>
                   </a:r>
+                  <a:r>
+                    <a:rPr lang="en-US" sz="1200" baseline="-25000" dirty="0">
+                      <a:solidFill>
+                        <a:schemeClr val="tx1"/>
+                      </a:solidFill>
+                    </a:rPr>
+                    <a:t>2</a:t>
+                  </a:r>
+                  <a:endParaRPr lang="en-US" sz="1200" dirty="0">
+                    <a:solidFill>
+                      <a:schemeClr val="tx1"/>
+                    </a:solidFill>
+                  </a:endParaRPr>
                 </a:p>
               </p:txBody>
             </p:sp>
@@ -6384,7 +6533,7 @@
               <p:spPr>
                 <a:xfrm>
                   <a:off x="2832101" y="1687192"/>
-                  <a:ext cx="467058" cy="1204875"/>
+                  <a:ext cx="511304" cy="1204875"/>
                 </a:xfrm>
                 <a:prstGeom prst="rect">
                   <a:avLst/>
@@ -6427,6 +6576,19 @@
                     </a:rPr>
                     <a:t>ADD</a:t>
                   </a:r>
+                  <a:r>
+                    <a:rPr lang="en-US" sz="1200" baseline="-25000" dirty="0">
+                      <a:solidFill>
+                        <a:schemeClr val="tx1"/>
+                      </a:solidFill>
+                    </a:rPr>
+                    <a:t>2</a:t>
+                  </a:r>
+                  <a:endParaRPr lang="en-US" sz="1200" dirty="0">
+                    <a:solidFill>
+                      <a:schemeClr val="tx1"/>
+                    </a:solidFill>
+                  </a:endParaRPr>
                 </a:p>
               </p:txBody>
             </p:sp>
@@ -6445,7 +6607,7 @@
               <p:spPr>
                 <a:xfrm>
                   <a:off x="2824833" y="3240329"/>
-                  <a:ext cx="467058" cy="1204875"/>
+                  <a:ext cx="511798" cy="1204875"/>
                 </a:xfrm>
                 <a:prstGeom prst="rect">
                   <a:avLst/>
@@ -6488,6 +6650,19 @@
                     </a:rPr>
                     <a:t>ADD</a:t>
                   </a:r>
+                  <a:r>
+                    <a:rPr lang="en-US" sz="1200" baseline="-25000" dirty="0">
+                      <a:solidFill>
+                        <a:schemeClr val="tx1"/>
+                      </a:solidFill>
+                    </a:rPr>
+                    <a:t>2</a:t>
+                  </a:r>
+                  <a:endParaRPr lang="en-US" sz="1200" dirty="0">
+                    <a:solidFill>
+                      <a:schemeClr val="tx1"/>
+                    </a:solidFill>
+                  </a:endParaRPr>
                 </a:p>
               </p:txBody>
             </p:sp>
@@ -6505,8 +6680,8 @@
               </p:nvSpPr>
               <p:spPr>
                 <a:xfrm>
-                  <a:off x="2826960" y="4807555"/>
-                  <a:ext cx="467058" cy="1204875"/>
+                  <a:off x="2826959" y="4807555"/>
+                  <a:ext cx="509959" cy="1204875"/>
                 </a:xfrm>
                 <a:prstGeom prst="rect">
                   <a:avLst/>
@@ -6549,6 +6724,19 @@
                     </a:rPr>
                     <a:t>ADD</a:t>
                   </a:r>
+                  <a:r>
+                    <a:rPr lang="en-US" sz="1200" baseline="-25000" dirty="0">
+                      <a:solidFill>
+                        <a:schemeClr val="tx1"/>
+                      </a:solidFill>
+                    </a:rPr>
+                    <a:t>2</a:t>
+                  </a:r>
+                  <a:endParaRPr lang="en-US" sz="1200" dirty="0">
+                    <a:solidFill>
+                      <a:schemeClr val="tx1"/>
+                    </a:solidFill>
+                  </a:endParaRPr>
                 </a:p>
               </p:txBody>
             </p:sp>
@@ -6893,13 +7081,15 @@
                     </a:ext>
                   </a:extLst>
                 </p:cNvPr>
-                <p:cNvCxnSpPr/>
+                <p:cNvCxnSpPr>
+                  <a:cxnSpLocks/>
+                </p:cNvCxnSpPr>
                 <p:nvPr/>
               </p:nvCxnSpPr>
               <p:spPr>
                 <a:xfrm>
-                  <a:off x="3299159" y="507580"/>
-                  <a:ext cx="508000" cy="0"/>
+                  <a:off x="3350178" y="507580"/>
+                  <a:ext cx="456981" cy="0"/>
                 </a:xfrm>
                 <a:prstGeom prst="line">
                   <a:avLst/>
@@ -6932,13 +7122,16 @@
                     </a:ext>
                   </a:extLst>
                 </p:cNvPr>
-                <p:cNvCxnSpPr/>
+                <p:cNvCxnSpPr>
+                  <a:cxnSpLocks/>
+                  <a:stCxn id="97" idx="3"/>
+                </p:cNvCxnSpPr>
                 <p:nvPr/>
               </p:nvCxnSpPr>
               <p:spPr>
-                <a:xfrm>
-                  <a:off x="3299159" y="735345"/>
-                  <a:ext cx="508000" cy="0"/>
+                <a:xfrm flipV="1">
+                  <a:off x="3350178" y="735345"/>
+                  <a:ext cx="456981" cy="462"/>
                 </a:xfrm>
                 <a:prstGeom prst="line">
                   <a:avLst/>
@@ -6969,13 +7162,15 @@
                     </a:ext>
                   </a:extLst>
                 </p:cNvPr>
-                <p:cNvCxnSpPr/>
+                <p:cNvCxnSpPr>
+                  <a:cxnSpLocks/>
+                </p:cNvCxnSpPr>
                 <p:nvPr/>
               </p:nvCxnSpPr>
               <p:spPr>
                 <a:xfrm>
-                  <a:off x="3291891" y="986707"/>
-                  <a:ext cx="508000" cy="0"/>
+                  <a:off x="3353565" y="986707"/>
+                  <a:ext cx="446326" cy="0"/>
                 </a:xfrm>
                 <a:prstGeom prst="line">
                   <a:avLst/>
@@ -7008,13 +7203,15 @@
                     </a:ext>
                   </a:extLst>
                 </p:cNvPr>
-                <p:cNvCxnSpPr/>
+                <p:cNvCxnSpPr>
+                  <a:cxnSpLocks/>
+                </p:cNvCxnSpPr>
                 <p:nvPr/>
               </p:nvCxnSpPr>
               <p:spPr>
                 <a:xfrm>
-                  <a:off x="3299159" y="2070331"/>
-                  <a:ext cx="508000" cy="0"/>
+                  <a:off x="3343405" y="2070331"/>
+                  <a:ext cx="463754" cy="0"/>
                 </a:xfrm>
                 <a:prstGeom prst="line">
                   <a:avLst/>
@@ -7047,13 +7244,16 @@
                     </a:ext>
                   </a:extLst>
                 </p:cNvPr>
-                <p:cNvCxnSpPr/>
+                <p:cNvCxnSpPr>
+                  <a:cxnSpLocks/>
+                  <a:stCxn id="98" idx="3"/>
+                </p:cNvCxnSpPr>
                 <p:nvPr/>
               </p:nvCxnSpPr>
               <p:spPr>
                 <a:xfrm>
-                  <a:off x="3299159" y="2298096"/>
-                  <a:ext cx="508000" cy="0"/>
+                  <a:off x="3343405" y="2289630"/>
+                  <a:ext cx="463754" cy="8466"/>
                 </a:xfrm>
                 <a:prstGeom prst="line">
                   <a:avLst/>
@@ -7084,13 +7284,15 @@
                     </a:ext>
                   </a:extLst>
                 </p:cNvPr>
-                <p:cNvCxnSpPr/>
+                <p:cNvCxnSpPr>
+                  <a:cxnSpLocks/>
+                </p:cNvCxnSpPr>
                 <p:nvPr/>
               </p:nvCxnSpPr>
               <p:spPr>
                 <a:xfrm>
-                  <a:off x="3291891" y="2540991"/>
-                  <a:ext cx="508000" cy="0"/>
+                  <a:off x="3343405" y="2540991"/>
+                  <a:ext cx="456486" cy="0"/>
                 </a:xfrm>
                 <a:prstGeom prst="line">
                   <a:avLst/>
@@ -7123,13 +7325,15 @@
                     </a:ext>
                   </a:extLst>
                 </p:cNvPr>
-                <p:cNvCxnSpPr/>
+                <p:cNvCxnSpPr>
+                  <a:cxnSpLocks/>
+                </p:cNvCxnSpPr>
                 <p:nvPr/>
               </p:nvCxnSpPr>
               <p:spPr>
                 <a:xfrm>
-                  <a:off x="3291891" y="3635564"/>
-                  <a:ext cx="508000" cy="0"/>
+                  <a:off x="3336631" y="3635564"/>
+                  <a:ext cx="463260" cy="0"/>
                 </a:xfrm>
                 <a:prstGeom prst="line">
                   <a:avLst/>
@@ -7162,13 +7366,15 @@
                     </a:ext>
                   </a:extLst>
                 </p:cNvPr>
-                <p:cNvCxnSpPr/>
+                <p:cNvCxnSpPr>
+                  <a:cxnSpLocks/>
+                </p:cNvCxnSpPr>
                 <p:nvPr/>
               </p:nvCxnSpPr>
               <p:spPr>
                 <a:xfrm>
-                  <a:off x="3291891" y="3863329"/>
-                  <a:ext cx="508000" cy="0"/>
+                  <a:off x="3332531" y="3863329"/>
+                  <a:ext cx="464687" cy="0"/>
                 </a:xfrm>
                 <a:prstGeom prst="line">
                   <a:avLst/>
@@ -7199,13 +7405,15 @@
                     </a:ext>
                   </a:extLst>
                 </p:cNvPr>
-                <p:cNvCxnSpPr/>
+                <p:cNvCxnSpPr>
+                  <a:cxnSpLocks/>
+                </p:cNvCxnSpPr>
                 <p:nvPr/>
               </p:nvCxnSpPr>
               <p:spPr>
                 <a:xfrm>
-                  <a:off x="3284623" y="4123158"/>
-                  <a:ext cx="508000" cy="0"/>
+                  <a:off x="3328649" y="4119771"/>
+                  <a:ext cx="465182" cy="0"/>
                 </a:xfrm>
                 <a:prstGeom prst="line">
                   <a:avLst/>
@@ -7238,13 +7446,15 @@
                     </a:ext>
                   </a:extLst>
                 </p:cNvPr>
-                <p:cNvCxnSpPr/>
+                <p:cNvCxnSpPr>
+                  <a:cxnSpLocks/>
+                </p:cNvCxnSpPr>
                 <p:nvPr/>
               </p:nvCxnSpPr>
               <p:spPr>
                 <a:xfrm>
-                  <a:off x="3299159" y="5194011"/>
-                  <a:ext cx="508000" cy="0"/>
+                  <a:off x="3329858" y="5194011"/>
+                  <a:ext cx="477301" cy="0"/>
                 </a:xfrm>
                 <a:prstGeom prst="line">
                   <a:avLst/>
@@ -7277,13 +7487,15 @@
                     </a:ext>
                   </a:extLst>
                 </p:cNvPr>
-                <p:cNvCxnSpPr/>
+                <p:cNvCxnSpPr>
+                  <a:cxnSpLocks/>
+                </p:cNvCxnSpPr>
                 <p:nvPr/>
               </p:nvCxnSpPr>
               <p:spPr>
                 <a:xfrm>
-                  <a:off x="3299159" y="5430243"/>
-                  <a:ext cx="508000" cy="0"/>
+                  <a:off x="3329639" y="5430243"/>
+                  <a:ext cx="464192" cy="0"/>
                 </a:xfrm>
                 <a:prstGeom prst="line">
                   <a:avLst/>
@@ -7314,13 +7526,15 @@
                     </a:ext>
                   </a:extLst>
                 </p:cNvPr>
-                <p:cNvCxnSpPr/>
+                <p:cNvCxnSpPr>
+                  <a:cxnSpLocks/>
+                </p:cNvCxnSpPr>
                 <p:nvPr/>
               </p:nvCxnSpPr>
               <p:spPr>
                 <a:xfrm>
-                  <a:off x="3291891" y="5673138"/>
-                  <a:ext cx="508000" cy="0"/>
+                  <a:off x="3336631" y="5673138"/>
+                  <a:ext cx="463260" cy="0"/>
                 </a:xfrm>
                 <a:prstGeom prst="line">
                   <a:avLst/>
@@ -7359,7 +7573,7 @@
               <p:spPr>
                 <a:xfrm>
                   <a:off x="3793452" y="373448"/>
-                  <a:ext cx="467058" cy="2302924"/>
+                  <a:ext cx="511766" cy="2302924"/>
                 </a:xfrm>
                 <a:prstGeom prst="rect">
                   <a:avLst/>
@@ -7402,6 +7616,19 @@
                     </a:rPr>
                     <a:t>ADD</a:t>
                   </a:r>
+                  <a:r>
+                    <a:rPr lang="en-US" sz="1200" baseline="-25000" dirty="0">
+                      <a:solidFill>
+                        <a:schemeClr val="tx1"/>
+                      </a:solidFill>
+                    </a:rPr>
+                    <a:t>3</a:t>
+                  </a:r>
+                  <a:endParaRPr lang="en-US" sz="1200" dirty="0">
+                    <a:solidFill>
+                      <a:schemeClr val="tx1"/>
+                    </a:solidFill>
+                  </a:endParaRPr>
                 </a:p>
               </p:txBody>
             </p:sp>
@@ -7419,8 +7646,8 @@
               </p:nvSpPr>
               <p:spPr>
                 <a:xfrm>
-                  <a:off x="3793452" y="3498984"/>
-                  <a:ext cx="467058" cy="2302924"/>
+                  <a:off x="3793451" y="3498984"/>
+                  <a:ext cx="512055" cy="2302924"/>
                 </a:xfrm>
                 <a:prstGeom prst="rect">
                   <a:avLst/>
@@ -7463,6 +7690,19 @@
                     </a:rPr>
                     <a:t>ADD</a:t>
                   </a:r>
+                  <a:r>
+                    <a:rPr lang="en-US" sz="1200" baseline="-25000" dirty="0">
+                      <a:solidFill>
+                        <a:schemeClr val="tx1"/>
+                      </a:solidFill>
+                    </a:rPr>
+                    <a:t>3</a:t>
+                  </a:r>
+                  <a:endParaRPr lang="en-US" sz="1200" dirty="0">
+                    <a:solidFill>
+                      <a:schemeClr val="tx1"/>
+                    </a:solidFill>
+                  </a:endParaRPr>
                 </a:p>
               </p:txBody>
             </p:sp>
@@ -7602,14 +7842,13 @@
                 </p:cNvPr>
                 <p:cNvCxnSpPr>
                   <a:cxnSpLocks/>
-                  <a:endCxn id="126" idx="2"/>
                 </p:cNvCxnSpPr>
                 <p:nvPr/>
               </p:nvCxnSpPr>
               <p:spPr>
-                <a:xfrm flipH="1" flipV="1">
-                  <a:off x="4026981" y="5801908"/>
-                  <a:ext cx="5962" cy="370738"/>
+                <a:xfrm flipV="1">
+                  <a:off x="4032943" y="5791895"/>
+                  <a:ext cx="0" cy="381738"/>
                 </a:xfrm>
                 <a:prstGeom prst="line">
                   <a:avLst/>
@@ -7642,13 +7881,15 @@
                     </a:ext>
                   </a:extLst>
                 </p:cNvPr>
-                <p:cNvCxnSpPr/>
+                <p:cNvCxnSpPr>
+                  <a:cxnSpLocks/>
+                </p:cNvCxnSpPr>
                 <p:nvPr/>
               </p:nvCxnSpPr>
               <p:spPr>
                 <a:xfrm>
-                  <a:off x="4260510" y="1174281"/>
-                  <a:ext cx="508000" cy="0"/>
+                  <a:off x="4305218" y="1174281"/>
+                  <a:ext cx="463292" cy="0"/>
                 </a:xfrm>
                 <a:prstGeom prst="line">
                   <a:avLst/>
@@ -7681,13 +7922,15 @@
                     </a:ext>
                   </a:extLst>
                 </p:cNvPr>
-                <p:cNvCxnSpPr/>
+                <p:cNvCxnSpPr>
+                  <a:cxnSpLocks/>
+                </p:cNvCxnSpPr>
                 <p:nvPr/>
               </p:nvCxnSpPr>
               <p:spPr>
                 <a:xfrm>
-                  <a:off x="4260510" y="1410513"/>
-                  <a:ext cx="508000" cy="0"/>
+                  <a:off x="4305218" y="1410513"/>
+                  <a:ext cx="463292" cy="0"/>
                 </a:xfrm>
                 <a:prstGeom prst="line">
                   <a:avLst/>
@@ -7718,13 +7961,15 @@
                     </a:ext>
                   </a:extLst>
                 </p:cNvPr>
-                <p:cNvCxnSpPr/>
+                <p:cNvCxnSpPr>
+                  <a:cxnSpLocks/>
+                </p:cNvCxnSpPr>
                 <p:nvPr/>
               </p:nvCxnSpPr>
               <p:spPr>
                 <a:xfrm>
-                  <a:off x="4261709" y="1644941"/>
-                  <a:ext cx="508000" cy="0"/>
+                  <a:off x="4305218" y="1644941"/>
+                  <a:ext cx="464491" cy="0"/>
                 </a:xfrm>
                 <a:prstGeom prst="line">
                   <a:avLst/>
@@ -7755,13 +8000,15 @@
                     </a:ext>
                   </a:extLst>
                 </p:cNvPr>
-                <p:cNvCxnSpPr/>
+                <p:cNvCxnSpPr>
+                  <a:cxnSpLocks/>
+                </p:cNvCxnSpPr>
                 <p:nvPr/>
               </p:nvCxnSpPr>
               <p:spPr>
                 <a:xfrm>
-                  <a:off x="4260510" y="1894033"/>
-                  <a:ext cx="508000" cy="0"/>
+                  <a:off x="4305218" y="1894033"/>
+                  <a:ext cx="463292" cy="0"/>
                 </a:xfrm>
                 <a:prstGeom prst="line">
                   <a:avLst/>
@@ -7794,13 +8041,15 @@
                     </a:ext>
                   </a:extLst>
                 </p:cNvPr>
-                <p:cNvCxnSpPr/>
+                <p:cNvCxnSpPr>
+                  <a:cxnSpLocks/>
+                </p:cNvCxnSpPr>
                 <p:nvPr/>
               </p:nvCxnSpPr>
               <p:spPr>
                 <a:xfrm>
-                  <a:off x="4261709" y="4311162"/>
-                  <a:ext cx="508000" cy="0"/>
+                  <a:off x="4305218" y="4311162"/>
+                  <a:ext cx="464491" cy="0"/>
                 </a:xfrm>
                 <a:prstGeom prst="line">
                   <a:avLst/>
@@ -7833,13 +8082,15 @@
                     </a:ext>
                   </a:extLst>
                 </p:cNvPr>
-                <p:cNvCxnSpPr/>
+                <p:cNvCxnSpPr>
+                  <a:cxnSpLocks/>
+                </p:cNvCxnSpPr>
                 <p:nvPr/>
               </p:nvCxnSpPr>
               <p:spPr>
                 <a:xfrm>
-                  <a:off x="4261709" y="4547394"/>
-                  <a:ext cx="508000" cy="0"/>
+                  <a:off x="4311991" y="4547394"/>
+                  <a:ext cx="457718" cy="0"/>
                 </a:xfrm>
                 <a:prstGeom prst="line">
                   <a:avLst/>
@@ -7870,13 +8121,15 @@
                     </a:ext>
                   </a:extLst>
                 </p:cNvPr>
-                <p:cNvCxnSpPr/>
+                <p:cNvCxnSpPr>
+                  <a:cxnSpLocks/>
+                </p:cNvCxnSpPr>
                 <p:nvPr/>
               </p:nvCxnSpPr>
               <p:spPr>
                 <a:xfrm>
-                  <a:off x="4262908" y="4781822"/>
-                  <a:ext cx="508000" cy="0"/>
+                  <a:off x="4305218" y="4781822"/>
+                  <a:ext cx="465690" cy="0"/>
                 </a:xfrm>
                 <a:prstGeom prst="line">
                   <a:avLst/>
@@ -7907,13 +8160,15 @@
                     </a:ext>
                   </a:extLst>
                 </p:cNvPr>
-                <p:cNvCxnSpPr/>
+                <p:cNvCxnSpPr>
+                  <a:cxnSpLocks/>
+                </p:cNvCxnSpPr>
                 <p:nvPr/>
               </p:nvCxnSpPr>
               <p:spPr>
                 <a:xfrm>
-                  <a:off x="4261709" y="5030914"/>
-                  <a:ext cx="508000" cy="0"/>
+                  <a:off x="4308605" y="5030914"/>
+                  <a:ext cx="461104" cy="0"/>
                 </a:xfrm>
                 <a:prstGeom prst="line">
                   <a:avLst/>
@@ -7951,8 +8206,8 @@
               </p:nvSpPr>
               <p:spPr>
                 <a:xfrm>
-                  <a:off x="4772341" y="1048972"/>
-                  <a:ext cx="467058" cy="4088244"/>
+                  <a:off x="4772340" y="1048972"/>
+                  <a:ext cx="510441" cy="4088244"/>
                 </a:xfrm>
                 <a:prstGeom prst="rect">
                   <a:avLst/>
@@ -7995,6 +8250,19 @@
                     </a:rPr>
                     <a:t>ADD</a:t>
                   </a:r>
+                  <a:r>
+                    <a:rPr lang="en-US" sz="1200" baseline="-25000" dirty="0">
+                      <a:solidFill>
+                        <a:schemeClr val="tx1"/>
+                      </a:solidFill>
+                    </a:rPr>
+                    <a:t>4</a:t>
+                  </a:r>
+                  <a:endParaRPr lang="en-US" sz="1200" dirty="0">
+                    <a:solidFill>
+                      <a:schemeClr val="tx1"/>
+                    </a:solidFill>
+                  </a:endParaRPr>
                 </a:p>
               </p:txBody>
             </p:sp>
@@ -8090,13 +8358,15 @@
                     </a:ext>
                   </a:extLst>
                 </p:cNvPr>
-                <p:cNvCxnSpPr/>
+                <p:cNvCxnSpPr>
+                  <a:cxnSpLocks/>
+                </p:cNvCxnSpPr>
                 <p:nvPr/>
               </p:nvCxnSpPr>
               <p:spPr>
                 <a:xfrm>
-                  <a:off x="5238200" y="2630347"/>
-                  <a:ext cx="508000" cy="0"/>
+                  <a:off x="5288371" y="2630347"/>
+                  <a:ext cx="457829" cy="0"/>
                 </a:xfrm>
                 <a:prstGeom prst="line">
                   <a:avLst/>
@@ -8129,13 +8399,15 @@
                     </a:ext>
                   </a:extLst>
                 </p:cNvPr>
-                <p:cNvCxnSpPr/>
+                <p:cNvCxnSpPr>
+                  <a:cxnSpLocks/>
+                </p:cNvCxnSpPr>
                 <p:nvPr/>
               </p:nvCxnSpPr>
               <p:spPr>
                 <a:xfrm>
-                  <a:off x="5238200" y="2866579"/>
-                  <a:ext cx="508000" cy="0"/>
+                  <a:off x="5279493" y="2866579"/>
+                  <a:ext cx="477845" cy="0"/>
                 </a:xfrm>
                 <a:prstGeom prst="line">
                   <a:avLst/>
@@ -8166,13 +8438,15 @@
                     </a:ext>
                   </a:extLst>
                 </p:cNvPr>
-                <p:cNvCxnSpPr/>
+                <p:cNvCxnSpPr>
+                  <a:cxnSpLocks/>
+                </p:cNvCxnSpPr>
                 <p:nvPr/>
               </p:nvCxnSpPr>
               <p:spPr>
                 <a:xfrm>
-                  <a:off x="5239399" y="3101007"/>
-                  <a:ext cx="508000" cy="0"/>
+                  <a:off x="5282141" y="3105445"/>
+                  <a:ext cx="475197" cy="0"/>
                 </a:xfrm>
                 <a:prstGeom prst="line">
                   <a:avLst/>
@@ -8203,13 +8477,15 @@
                     </a:ext>
                   </a:extLst>
                 </p:cNvPr>
-                <p:cNvCxnSpPr/>
+                <p:cNvCxnSpPr>
+                  <a:cxnSpLocks/>
+                </p:cNvCxnSpPr>
                 <p:nvPr/>
               </p:nvCxnSpPr>
               <p:spPr>
                 <a:xfrm>
-                  <a:off x="5238200" y="3350099"/>
-                  <a:ext cx="508000" cy="0"/>
+                  <a:off x="5283932" y="3350099"/>
+                  <a:ext cx="473406" cy="0"/>
                 </a:xfrm>
                 <a:prstGeom prst="line">
                   <a:avLst/>
@@ -8240,13 +8516,15 @@
                     </a:ext>
                   </a:extLst>
                 </p:cNvPr>
-                <p:cNvCxnSpPr/>
+                <p:cNvCxnSpPr>
+                  <a:cxnSpLocks/>
+                </p:cNvCxnSpPr>
                 <p:nvPr/>
               </p:nvCxnSpPr>
               <p:spPr>
                 <a:xfrm>
-                  <a:off x="5238200" y="3590530"/>
-                  <a:ext cx="508000" cy="0"/>
+                  <a:off x="5288371" y="3590530"/>
+                  <a:ext cx="468967" cy="0"/>
                 </a:xfrm>
                 <a:prstGeom prst="line">
                   <a:avLst/>
@@ -11990,7 +12268,7 @@
           </p:nvCxnSpPr>
           <p:spPr>
             <a:xfrm>
-              <a:off x="5580467" y="5277629"/>
+              <a:off x="5586730" y="5277629"/>
               <a:ext cx="243392" cy="0"/>
             </a:xfrm>
             <a:prstGeom prst="line">
@@ -12029,7 +12307,7 @@
           </p:nvSpPr>
           <p:spPr>
             <a:xfrm>
-              <a:off x="5473959" y="4427034"/>
+              <a:off x="5491715" y="4427034"/>
               <a:ext cx="69528" cy="942067"/>
             </a:xfrm>
             <a:prstGeom prst="leftBrace">
@@ -12080,7 +12358,7 @@
               </p:nvSpPr>
               <p:spPr>
                 <a:xfrm rot="16200000">
-                  <a:off x="5139189" y="4776537"/>
+                  <a:off x="5156945" y="4776537"/>
                   <a:ext cx="583663" cy="276999"/>
                 </a:xfrm>
                 <a:prstGeom prst="rect">
@@ -12143,7 +12421,7 @@
               </p:nvSpPr>
               <p:spPr>
                 <a:xfrm rot="16200000">
-                  <a:off x="5139189" y="4776537"/>
+                  <a:off x="5156945" y="4776537"/>
                   <a:ext cx="583663" cy="276999"/>
                 </a:xfrm>
                 <a:prstGeom prst="rect">

</xml_diff>